<commit_message>
assignment w4 and w6 small updates
</commit_message>
<xml_diff>
--- a/w6_analysis_of_text_pt1/w6_analysis_of_text.pptx
+++ b/w6_analysis_of_text_pt1/w6_analysis_of_text.pptx
@@ -243,10 +243,25 @@
   <pc:docChgLst>
     <pc:chgData name="Peter McGinty" userId="138e04b35f3df159" providerId="LiveId" clId="{31E67A8E-B6FC-49A3-9D2B-13822748E37A}"/>
     <pc:docChg chg="undo custSel addSld delSld modSld sldOrd addSection modSection modNotesMaster">
-      <pc:chgData name="Peter McGinty" userId="138e04b35f3df159" providerId="LiveId" clId="{31E67A8E-B6FC-49A3-9D2B-13822748E37A}" dt="2021-11-01T07:29:37.964" v="6975" actId="20577"/>
+      <pc:chgData name="Peter McGinty" userId="138e04b35f3df159" providerId="LiveId" clId="{31E67A8E-B6FC-49A3-9D2B-13822748E37A}" dt="2021-11-09T10:35:47.333" v="7022" actId="20577"/>
       <pc:docMkLst>
         <pc:docMk/>
       </pc:docMkLst>
+      <pc:sldChg chg="modSp mod">
+        <pc:chgData name="Peter McGinty" userId="138e04b35f3df159" providerId="LiveId" clId="{31E67A8E-B6FC-49A3-9D2B-13822748E37A}" dt="2021-11-09T10:31:52.092" v="6995" actId="20577"/>
+        <pc:sldMkLst>
+          <pc:docMk/>
+          <pc:sldMk cId="1277258620" sldId="256"/>
+        </pc:sldMkLst>
+        <pc:spChg chg="mod">
+          <ac:chgData name="Peter McGinty" userId="138e04b35f3df159" providerId="LiveId" clId="{31E67A8E-B6FC-49A3-9D2B-13822748E37A}" dt="2021-11-09T10:31:52.092" v="6995" actId="20577"/>
+          <ac:spMkLst>
+            <pc:docMk/>
+            <pc:sldMk cId="1277258620" sldId="256"/>
+            <ac:spMk id="3" creationId="{F6302E3A-3C29-440E-AEA3-F39028C62D24}"/>
+          </ac:spMkLst>
+        </pc:spChg>
+      </pc:sldChg>
       <pc:sldChg chg="addSp delSp modSp mod modClrScheme chgLayout">
         <pc:chgData name="Peter McGinty" userId="138e04b35f3df159" providerId="LiveId" clId="{31E67A8E-B6FC-49A3-9D2B-13822748E37A}" dt="2021-10-28T07:51:00.909" v="2115" actId="20577"/>
         <pc:sldMkLst>
@@ -294,7 +309,7 @@
         </pc:sldMkLst>
       </pc:sldChg>
       <pc:sldChg chg="addSp modSp new mod modClrScheme chgLayout">
-        <pc:chgData name="Peter McGinty" userId="138e04b35f3df159" providerId="LiveId" clId="{31E67A8E-B6FC-49A3-9D2B-13822748E37A}" dt="2021-11-01T07:15:37.341" v="6717" actId="6549"/>
+        <pc:chgData name="Peter McGinty" userId="138e04b35f3df159" providerId="LiveId" clId="{31E67A8E-B6FC-49A3-9D2B-13822748E37A}" dt="2021-11-09T10:35:47.333" v="7022" actId="20577"/>
         <pc:sldMkLst>
           <pc:docMk/>
           <pc:sldMk cId="2894884445" sldId="259"/>
@@ -316,7 +331,7 @@
           </ac:spMkLst>
         </pc:spChg>
         <pc:spChg chg="add mod ord">
-          <ac:chgData name="Peter McGinty" userId="138e04b35f3df159" providerId="LiveId" clId="{31E67A8E-B6FC-49A3-9D2B-13822748E37A}" dt="2021-11-01T07:15:37.341" v="6717" actId="6549"/>
+          <ac:chgData name="Peter McGinty" userId="138e04b35f3df159" providerId="LiveId" clId="{31E67A8E-B6FC-49A3-9D2B-13822748E37A}" dt="2021-11-09T10:35:47.333" v="7022" actId="20577"/>
           <ac:spMkLst>
             <pc:docMk/>
             <pc:sldMk cId="2894884445" sldId="259"/>
@@ -4085,7 +4100,7 @@
           <a:p>
             <a:fld id="{4F32A8AD-D88C-43C4-A5DB-9A2270A43820}" type="datetimeFigureOut">
               <a:rPr lang="en-GB" smtClean="0"/>
-              <a:t>01/11/2021</a:t>
+              <a:t>09/11/2021</a:t>
             </a:fld>
             <a:endParaRPr lang="en-GB"/>
           </a:p>
@@ -4502,7 +4517,7 @@
           <a:p>
             <a:fld id="{B37FB541-4568-42CE-BB01-FB37BE7917AF}" type="datetimeFigureOut">
               <a:rPr lang="en-GB" smtClean="0"/>
-              <a:t>01/11/2021</a:t>
+              <a:t>09/11/2021</a:t>
             </a:fld>
             <a:endParaRPr lang="en-GB"/>
           </a:p>
@@ -4702,7 +4717,7 @@
           <a:p>
             <a:fld id="{B37FB541-4568-42CE-BB01-FB37BE7917AF}" type="datetimeFigureOut">
               <a:rPr lang="en-GB" smtClean="0"/>
-              <a:t>01/11/2021</a:t>
+              <a:t>09/11/2021</a:t>
             </a:fld>
             <a:endParaRPr lang="en-GB"/>
           </a:p>
@@ -4912,7 +4927,7 @@
           <a:p>
             <a:fld id="{B37FB541-4568-42CE-BB01-FB37BE7917AF}" type="datetimeFigureOut">
               <a:rPr lang="en-GB" smtClean="0"/>
-              <a:t>01/11/2021</a:t>
+              <a:t>09/11/2021</a:t>
             </a:fld>
             <a:endParaRPr lang="en-GB"/>
           </a:p>
@@ -5110,7 +5125,7 @@
           <a:p>
             <a:fld id="{EC76F3B4-0850-104A-892F-23AD12B44846}" type="datetimeFigureOut">
               <a:rPr lang="en-GB" smtClean="0"/>
-              <a:t>01/11/2021</a:t>
+              <a:t>09/11/2021</a:t>
             </a:fld>
             <a:endParaRPr lang="en-GB"/>
           </a:p>
@@ -5223,7 +5238,7 @@
           <a:p>
             <a:fld id="{EC76F3B4-0850-104A-892F-23AD12B44846}" type="datetimeFigureOut">
               <a:rPr lang="en-GB" smtClean="0"/>
-              <a:t>01/11/2021</a:t>
+              <a:t>09/11/2021</a:t>
             </a:fld>
             <a:endParaRPr lang="en-GB"/>
           </a:p>
@@ -5423,7 +5438,7 @@
           <a:p>
             <a:fld id="{B37FB541-4568-42CE-BB01-FB37BE7917AF}" type="datetimeFigureOut">
               <a:rPr lang="en-GB" smtClean="0"/>
-              <a:t>01/11/2021</a:t>
+              <a:t>09/11/2021</a:t>
             </a:fld>
             <a:endParaRPr lang="en-GB"/>
           </a:p>
@@ -5699,7 +5714,7 @@
           <a:p>
             <a:fld id="{B37FB541-4568-42CE-BB01-FB37BE7917AF}" type="datetimeFigureOut">
               <a:rPr lang="en-GB" smtClean="0"/>
-              <a:t>01/11/2021</a:t>
+              <a:t>09/11/2021</a:t>
             </a:fld>
             <a:endParaRPr lang="en-GB"/>
           </a:p>
@@ -5967,7 +5982,7 @@
           <a:p>
             <a:fld id="{B37FB541-4568-42CE-BB01-FB37BE7917AF}" type="datetimeFigureOut">
               <a:rPr lang="en-GB" smtClean="0"/>
-              <a:t>01/11/2021</a:t>
+              <a:t>09/11/2021</a:t>
             </a:fld>
             <a:endParaRPr lang="en-GB"/>
           </a:p>
@@ -6382,7 +6397,7 @@
           <a:p>
             <a:fld id="{B37FB541-4568-42CE-BB01-FB37BE7917AF}" type="datetimeFigureOut">
               <a:rPr lang="en-GB" smtClean="0"/>
-              <a:t>01/11/2021</a:t>
+              <a:t>09/11/2021</a:t>
             </a:fld>
             <a:endParaRPr lang="en-GB"/>
           </a:p>
@@ -6524,7 +6539,7 @@
           <a:p>
             <a:fld id="{B37FB541-4568-42CE-BB01-FB37BE7917AF}" type="datetimeFigureOut">
               <a:rPr lang="en-GB" smtClean="0"/>
-              <a:t>01/11/2021</a:t>
+              <a:t>09/11/2021</a:t>
             </a:fld>
             <a:endParaRPr lang="en-GB"/>
           </a:p>
@@ -6637,7 +6652,7 @@
           <a:p>
             <a:fld id="{B37FB541-4568-42CE-BB01-FB37BE7917AF}" type="datetimeFigureOut">
               <a:rPr lang="en-GB" smtClean="0"/>
-              <a:t>01/11/2021</a:t>
+              <a:t>09/11/2021</a:t>
             </a:fld>
             <a:endParaRPr lang="en-GB"/>
           </a:p>
@@ -6950,7 +6965,7 @@
           <a:p>
             <a:fld id="{B37FB541-4568-42CE-BB01-FB37BE7917AF}" type="datetimeFigureOut">
               <a:rPr lang="en-GB" smtClean="0"/>
-              <a:t>01/11/2021</a:t>
+              <a:t>09/11/2021</a:t>
             </a:fld>
             <a:endParaRPr lang="en-GB"/>
           </a:p>
@@ -7239,7 +7254,7 @@
           <a:p>
             <a:fld id="{B37FB541-4568-42CE-BB01-FB37BE7917AF}" type="datetimeFigureOut">
               <a:rPr lang="en-GB" smtClean="0"/>
-              <a:t>01/11/2021</a:t>
+              <a:t>09/11/2021</a:t>
             </a:fld>
             <a:endParaRPr lang="en-GB"/>
           </a:p>
@@ -7482,7 +7497,7 @@
           <a:p>
             <a:fld id="{B37FB541-4568-42CE-BB01-FB37BE7917AF}" type="datetimeFigureOut">
               <a:rPr lang="en-GB" smtClean="0"/>
-              <a:t>01/11/2021</a:t>
+              <a:t>09/11/2021</a:t>
             </a:fld>
             <a:endParaRPr lang="en-GB"/>
           </a:p>
@@ -8050,7 +8065,7 @@
           <a:p>
             <a:fld id="{EC76F3B4-0850-104A-892F-23AD12B44846}" type="datetimeFigureOut">
               <a:rPr lang="en-GB" smtClean="0"/>
-              <a:t>01/11/2021</a:t>
+              <a:t>09/11/2021</a:t>
             </a:fld>
             <a:endParaRPr lang="en-GB"/>
           </a:p>
@@ -8521,7 +8536,7 @@
           <a:p>
             <a:r>
               <a:rPr lang="en-GB" dirty="0"/>
-              <a:t>6 – Analysis of text</a:t>
+              <a:t>11 – Jupyter Notebooks</a:t>
             </a:r>
           </a:p>
         </p:txBody>
@@ -15125,6 +15140,15 @@
             <a:r>
               <a:rPr lang="en-GB" dirty="0"/>
               <a:t>Relative frequency</a:t>
+            </a:r>
+          </a:p>
+          <a:p>
+            <a:pPr marL="0" indent="0">
+              <a:buNone/>
+            </a:pPr>
+            <a:r>
+              <a:rPr lang="en-GB" dirty="0"/>
+              <a:t>Simple pattern recognition</a:t>
             </a:r>
           </a:p>
           <a:p>

</xml_diff>